<commit_message>
Fix cloud-config.yaml for apt
</commit_message>
<xml_diff>
--- a/curriculum/1_preparation/3_vscode.pptx
+++ b/curriculum/1_preparation/3_vscode.pptx
@@ -197,7 +197,7 @@
           </a:lstStyle>
           <a:p>
             <a:fld id="{F356C141-9813-2243-A41E-9A104DB6DD74}" type="datetimeFigureOut">
-              <a:t>2022/4/16</a:t>
+              <a:t>2022/6/6</a:t>
             </a:fld>
             <a:endParaRPr kumimoji="1" lang="ja-JP" altLang="en-US"/>
           </a:p>
@@ -540,116 +540,68 @@
           <a:lstStyle/>
           <a:p>
             <a:r>
-              <a:rPr kumimoji="1" lang="ja-JP" altLang="en-US"/>
-              <a:t>この</a:t>
-            </a:r>
-            <a:r>
               <a:rPr kumimoji="1" lang="en-US" altLang="ja-JP"/>
-              <a:t>Algorand</a:t>
-            </a:r>
-            <a:r>
-              <a:rPr kumimoji="1" lang="ja-JP" altLang="en-US"/>
-              <a:t>教育プログラム用の</a:t>
+              <a:t>Visual Studio Code</a:t>
+            </a:r>
+            <a:r>
+              <a:rPr kumimoji="1" lang="ja-JP" altLang="en-US"/>
+              <a:t>のサイトにアクセスして、</a:t>
             </a:r>
             <a:r>
               <a:rPr kumimoji="1" lang="en-US" altLang="ja-JP"/>
-              <a:t>Github</a:t>
-            </a:r>
-            <a:r>
-              <a:rPr kumimoji="1" lang="ja-JP" altLang="en-US"/>
-              <a:t>リポジトリがあるので、</a:t>
-            </a:r>
+              <a:t>VSCode</a:t>
+            </a:r>
+            <a:r>
+              <a:rPr kumimoji="1" lang="ja-JP" altLang="en-US"/>
+              <a:t>をダウンロードし、インストールします。</a:t>
+            </a:r>
+            <a:endParaRPr kumimoji="1" lang="en-US" altLang="ja-JP"/>
+          </a:p>
+          <a:p>
+            <a:endParaRPr kumimoji="1" lang="en-US" altLang="ja-JP"/>
+          </a:p>
+          <a:p>
+            <a:r>
+              <a:rPr kumimoji="1" lang="ja-JP" altLang="en-US"/>
+              <a:t>拡張機能をインストールします。</a:t>
+            </a:r>
+            <a:endParaRPr kumimoji="1" lang="en-US" altLang="ja-JP"/>
+          </a:p>
+          <a:p>
             <a:r>
               <a:rPr kumimoji="1" lang="en-US" altLang="ja-JP"/>
-              <a:t>git clone</a:t>
-            </a:r>
-            <a:r>
-              <a:rPr kumimoji="1" lang="ja-JP" altLang="en-US"/>
-              <a:t>しましょう。</a:t>
+              <a:t>Mac</a:t>
+            </a:r>
+            <a:r>
+              <a:rPr kumimoji="1" lang="ja-JP" altLang="en-US"/>
+              <a:t>は、メニューの</a:t>
+            </a:r>
+            <a:r>
+              <a:rPr kumimoji="1" lang="en-US" altLang="ja-JP"/>
+              <a:t>Code -&gt; Preferences -&gt; Extensions</a:t>
+            </a:r>
+            <a:r>
+              <a:rPr kumimoji="1" lang="ja-JP" altLang="en-US"/>
+              <a:t>を開きます。</a:t>
             </a:r>
             <a:endParaRPr kumimoji="1" lang="en-US" altLang="ja-JP"/>
           </a:p>
           <a:p>
             <a:r>
-              <a:rPr kumimoji="1" lang="ja-JP" altLang="en-US"/>
-              <a:t>そして、</a:t>
-            </a:r>
-            <a:r>
-              <a:rPr lang="en-US" altLang="ja-JP" sz="1200"/>
-              <a:t>algorand_education_program</a:t>
-            </a:r>
-            <a:r>
-              <a:rPr lang="ja-JP" altLang="en-US" sz="1200"/>
-              <a:t>ディレクトリに</a:t>
-            </a:r>
-            <a:r>
-              <a:rPr lang="en-US" altLang="ja-JP" sz="1200"/>
-              <a:t>cd</a:t>
-            </a:r>
-            <a:r>
-              <a:rPr lang="ja-JP" altLang="en-US" sz="1200"/>
-              <a:t>します。</a:t>
-            </a:r>
-            <a:endParaRPr lang="en-US" altLang="ja-JP" sz="1200"/>
-          </a:p>
-          <a:p>
-            <a:r>
-              <a:rPr lang="en" altLang="ja-JP"/>
-              <a:t>Algorand Sandbox</a:t>
-            </a:r>
-            <a:r>
-              <a:rPr lang="ja-JP" altLang="en-US"/>
-              <a:t>のリポジトリを</a:t>
-            </a:r>
-            <a:r>
-              <a:rPr lang="en-US" altLang="ja-JP"/>
-              <a:t>git clone</a:t>
-            </a:r>
-            <a:r>
-              <a:rPr lang="ja-JP" altLang="en-US"/>
-              <a:t>しましょう。</a:t>
-            </a:r>
-            <a:endParaRPr lang="en-US" altLang="ja-JP"/>
-          </a:p>
-          <a:p>
-            <a:r>
-              <a:rPr kumimoji="1" lang="ja-JP" altLang="en-US"/>
-              <a:t>そして、</a:t>
-            </a:r>
-            <a:r>
-              <a:rPr kumimoji="1" lang="en-US" altLang="ja-JP" sz="1200"/>
-              <a:t>sandbox</a:t>
-            </a:r>
-            <a:r>
-              <a:rPr lang="ja-JP" altLang="en-US" sz="1200"/>
-              <a:t>ディレクトリに</a:t>
-            </a:r>
-            <a:r>
-              <a:rPr lang="en-US" altLang="ja-JP" sz="1200"/>
-              <a:t>cd</a:t>
-            </a:r>
-            <a:r>
-              <a:rPr lang="ja-JP" altLang="en-US" sz="1200"/>
-              <a:t>します。</a:t>
-            </a:r>
-            <a:endParaRPr lang="en-US" altLang="ja-JP" sz="1200"/>
-          </a:p>
-          <a:p>
-            <a:r>
-              <a:rPr kumimoji="1" lang="en-US" altLang="ja-JP" sz="1200"/>
-              <a:t>Sandbox</a:t>
-            </a:r>
-            <a:r>
-              <a:rPr kumimoji="1" lang="ja-JP" altLang="en-US" sz="1200"/>
-              <a:t>は、</a:t>
-            </a:r>
-            <a:r>
-              <a:rPr kumimoji="1" lang="en-US" altLang="ja-JP" sz="1200"/>
-              <a:t>Algorand</a:t>
-            </a:r>
-            <a:r>
-              <a:rPr kumimoji="1" lang="ja-JP" altLang="en-US" sz="1200"/>
-              <a:t>の開発用ノードです。</a:t>
+              <a:rPr kumimoji="1" lang="en-US" altLang="ja-JP"/>
+              <a:t>Windows</a:t>
+            </a:r>
+            <a:r>
+              <a:rPr kumimoji="1" lang="ja-JP" altLang="en-US"/>
+              <a:t>は、メニューの</a:t>
+            </a:r>
+            <a:r>
+              <a:rPr kumimoji="1" lang="en-US" altLang="ja-JP"/>
+              <a:t>File -&gt; Preferences -&gt; Extensions</a:t>
+            </a:r>
+            <a:r>
+              <a:rPr kumimoji="1" lang="ja-JP" altLang="en-US"/>
+              <a:t>を開きます。</a:t>
             </a:r>
             <a:endParaRPr kumimoji="1" lang="en-US" altLang="ja-JP"/>
           </a:p>
@@ -735,82 +687,72 @@
           <a:lstStyle/>
           <a:p>
             <a:r>
+              <a:rPr kumimoji="1" lang="ja-JP" altLang="en-US"/>
+              <a:t>左上の検索窓に</a:t>
+            </a:r>
+            <a:r>
               <a:rPr kumimoji="1" lang="en-US" altLang="ja-JP"/>
-              <a:t>Sandbox</a:t>
-            </a:r>
-            <a:r>
-              <a:rPr kumimoji="1" lang="ja-JP" altLang="en-US"/>
-              <a:t>を開発モードで起動しましょう。</a:t>
+              <a:t>remote development</a:t>
+            </a:r>
+            <a:r>
+              <a:rPr kumimoji="1" lang="ja-JP" altLang="en-US"/>
+              <a:t>と入力し、</a:t>
+            </a:r>
+            <a:r>
+              <a:rPr kumimoji="1" lang="en-US" altLang="ja-JP"/>
+              <a:t>Remote Development</a:t>
+            </a:r>
+            <a:r>
+              <a:rPr kumimoji="1" lang="ja-JP" altLang="en-US"/>
+              <a:t>をインストールします。</a:t>
             </a:r>
             <a:endParaRPr kumimoji="1" lang="en-US" altLang="ja-JP"/>
           </a:p>
           <a:p>
-            <a:r>
-              <a:rPr kumimoji="1" lang="ja-JP" altLang="en-US"/>
-              <a:t>エラーメッセージが表示された場合は、</a:t>
+            <a:endParaRPr kumimoji="1" lang="en-US" altLang="ja-JP"/>
+          </a:p>
+          <a:p>
+            <a:r>
+              <a:rPr kumimoji="1" lang="ja-JP" altLang="en-US"/>
+              <a:t>左下の緑のアイコンをクリックし、</a:t>
             </a:r>
             <a:r>
               <a:rPr kumimoji="1" lang="en-US" altLang="ja-JP"/>
-              <a:t>Docker.app</a:t>
-            </a:r>
-            <a:r>
-              <a:rPr kumimoji="1" lang="ja-JP" altLang="en-US"/>
-              <a:t>が起動されているか確認しましょう。</a:t>
+              <a:t>Connect to Host</a:t>
+            </a:r>
+            <a:r>
+              <a:rPr kumimoji="1" lang="ja-JP" altLang="en-US"/>
+              <a:t>を選びます。</a:t>
             </a:r>
             <a:endParaRPr kumimoji="1" lang="en-US" altLang="ja-JP"/>
           </a:p>
           <a:p>
             <a:r>
               <a:rPr kumimoji="1" lang="en-US" altLang="ja-JP"/>
-              <a:t>Docker.app</a:t>
-            </a:r>
-            <a:r>
-              <a:rPr kumimoji="1" lang="ja-JP" altLang="en-US"/>
-              <a:t>を起動後、もう一度</a:t>
+              <a:t>ubuntu</a:t>
+            </a:r>
+            <a:r>
+              <a:rPr kumimoji="1" lang="ja-JP" altLang="en-US"/>
+              <a:t>と表示されるので、</a:t>
             </a:r>
             <a:r>
               <a:rPr kumimoji="1" lang="en-US" altLang="ja-JP"/>
-              <a:t>Sandbox</a:t>
-            </a:r>
-            <a:r>
-              <a:rPr kumimoji="1" lang="ja-JP" altLang="en-US"/>
-              <a:t>を起動します。</a:t>
+              <a:t>ubuntu</a:t>
+            </a:r>
+            <a:r>
+              <a:rPr kumimoji="1" lang="ja-JP" altLang="en-US"/>
+              <a:t>を選びます。</a:t>
             </a:r>
             <a:endParaRPr kumimoji="1" lang="en-US" altLang="ja-JP"/>
           </a:p>
           <a:p>
             <a:r>
-              <a:rPr kumimoji="1" lang="ja-JP" altLang="en-US"/>
-              <a:t>最初は、かなり時間がかかりますが、辛抱強く待ちましょう。</a:t>
-            </a:r>
-            <a:endParaRPr kumimoji="1" lang="en-US" altLang="ja-JP"/>
-          </a:p>
-          <a:p>
-            <a:r>
-              <a:rPr kumimoji="1" lang="ja-JP" altLang="en-US"/>
-              <a:t>二度目からはそんなに時間はかかりません。</a:t>
-            </a:r>
-            <a:endParaRPr kumimoji="1" lang="en-US" altLang="ja-JP"/>
-          </a:p>
-          <a:p>
-            <a:r>
-              <a:rPr kumimoji="1" lang="ja-JP" altLang="en-US"/>
-              <a:t>正常に起動したら、</a:t>
-            </a:r>
-            <a:r>
               <a:rPr kumimoji="1" lang="en-US" altLang="ja-JP"/>
-              <a:t>Sandbox</a:t>
-            </a:r>
-            <a:r>
-              <a:rPr kumimoji="1" lang="ja-JP" altLang="en-US"/>
-              <a:t>を終了させましょう。</a:t>
-            </a:r>
-            <a:endParaRPr kumimoji="1" lang="en-US" altLang="ja-JP"/>
-          </a:p>
-          <a:p>
-            <a:r>
-              <a:rPr kumimoji="1" lang="ja-JP" altLang="en-US"/>
-              <a:t>すぐに終了するはずです。</a:t>
+              <a:t>Terminal</a:t>
+            </a:r>
+            <a:r>
+              <a:rPr kumimoji="1" lang="ja-JP" altLang="en-US"/>
+              <a:t>が表示されればうまく行っています。</a:t>
             </a:r>
             <a:endParaRPr kumimoji="1" lang="en-US" altLang="ja-JP"/>
           </a:p>
@@ -841,7 +783,7 @@
     </p:spTree>
     <p:extLst>
       <p:ext uri="{BB962C8B-B14F-4D97-AF65-F5344CB8AC3E}">
-        <p14:creationId xmlns:p14="http://schemas.microsoft.com/office/powerpoint/2010/main" val="1008319566"/>
+        <p14:creationId xmlns:p14="http://schemas.microsoft.com/office/powerpoint/2010/main" val="3179173553"/>
       </p:ext>
     </p:extLst>
   </p:cSld>
@@ -997,7 +939,7 @@
           <a:lstStyle/>
           <a:p>
             <a:fld id="{35A3F9D9-9E9B-AC43-A70E-8712BBF1C569}" type="datetimeFigureOut">
-              <a:t>2022/4/16</a:t>
+              <a:t>2022/6/6</a:t>
             </a:fld>
             <a:endParaRPr kumimoji="1" lang="ja-JP" altLang="en-US"/>
           </a:p>
@@ -1225,7 +1167,7 @@
           <a:lstStyle/>
           <a:p>
             <a:fld id="{35A3F9D9-9E9B-AC43-A70E-8712BBF1C569}" type="datetimeFigureOut">
-              <a:t>2022/4/16</a:t>
+              <a:t>2022/6/6</a:t>
             </a:fld>
             <a:endParaRPr kumimoji="1" lang="ja-JP" altLang="en-US"/>
           </a:p>
@@ -1463,7 +1405,7 @@
           <a:lstStyle/>
           <a:p>
             <a:fld id="{35A3F9D9-9E9B-AC43-A70E-8712BBF1C569}" type="datetimeFigureOut">
-              <a:t>2022/4/16</a:t>
+              <a:t>2022/6/6</a:t>
             </a:fld>
             <a:endParaRPr kumimoji="1" lang="ja-JP" altLang="en-US"/>
           </a:p>
@@ -1691,7 +1633,7 @@
           <a:lstStyle/>
           <a:p>
             <a:fld id="{35A3F9D9-9E9B-AC43-A70E-8712BBF1C569}" type="datetimeFigureOut">
-              <a:t>2022/4/16</a:t>
+              <a:t>2022/6/6</a:t>
             </a:fld>
             <a:endParaRPr kumimoji="1" lang="ja-JP" altLang="en-US"/>
           </a:p>
@@ -1964,7 +1906,7 @@
           <a:lstStyle/>
           <a:p>
             <a:fld id="{35A3F9D9-9E9B-AC43-A70E-8712BBF1C569}" type="datetimeFigureOut">
-              <a:t>2022/4/16</a:t>
+              <a:t>2022/6/6</a:t>
             </a:fld>
             <a:endParaRPr kumimoji="1" lang="ja-JP" altLang="en-US"/>
           </a:p>
@@ -2291,7 +2233,7 @@
           <a:lstStyle/>
           <a:p>
             <a:fld id="{35A3F9D9-9E9B-AC43-A70E-8712BBF1C569}" type="datetimeFigureOut">
-              <a:t>2022/4/16</a:t>
+              <a:t>2022/6/6</a:t>
             </a:fld>
             <a:endParaRPr kumimoji="1" lang="ja-JP" altLang="en-US"/>
           </a:p>
@@ -2765,7 +2707,7 @@
           <a:lstStyle/>
           <a:p>
             <a:fld id="{35A3F9D9-9E9B-AC43-A70E-8712BBF1C569}" type="datetimeFigureOut">
-              <a:t>2022/4/16</a:t>
+              <a:t>2022/6/6</a:t>
             </a:fld>
             <a:endParaRPr kumimoji="1" lang="ja-JP" altLang="en-US"/>
           </a:p>
@@ -2904,7 +2846,7 @@
           <a:lstStyle/>
           <a:p>
             <a:fld id="{35A3F9D9-9E9B-AC43-A70E-8712BBF1C569}" type="datetimeFigureOut">
-              <a:t>2022/4/16</a:t>
+              <a:t>2022/6/6</a:t>
             </a:fld>
             <a:endParaRPr kumimoji="1" lang="ja-JP" altLang="en-US"/>
           </a:p>
@@ -3015,7 +2957,7 @@
           <a:lstStyle/>
           <a:p>
             <a:fld id="{35A3F9D9-9E9B-AC43-A70E-8712BBF1C569}" type="datetimeFigureOut">
-              <a:t>2022/4/16</a:t>
+              <a:t>2022/6/6</a:t>
             </a:fld>
             <a:endParaRPr kumimoji="1" lang="ja-JP" altLang="en-US"/>
           </a:p>
@@ -3356,7 +3298,7 @@
           <a:lstStyle/>
           <a:p>
             <a:fld id="{35A3F9D9-9E9B-AC43-A70E-8712BBF1C569}" type="datetimeFigureOut">
-              <a:t>2022/4/16</a:t>
+              <a:t>2022/6/6</a:t>
             </a:fld>
             <a:endParaRPr kumimoji="1" lang="ja-JP" altLang="en-US"/>
           </a:p>
@@ -3642,7 +3584,7 @@
           <a:lstStyle/>
           <a:p>
             <a:fld id="{35A3F9D9-9E9B-AC43-A70E-8712BBF1C569}" type="datetimeFigureOut">
-              <a:t>2022/4/16</a:t>
+              <a:t>2022/6/6</a:t>
             </a:fld>
             <a:endParaRPr kumimoji="1" lang="ja-JP" altLang="en-US"/>
           </a:p>
@@ -3913,7 +3855,7 @@
           </a:lstStyle>
           <a:p>
             <a:fld id="{35A3F9D9-9E9B-AC43-A70E-8712BBF1C569}" type="datetimeFigureOut">
-              <a:t>2022/4/16</a:t>
+              <a:t>2022/6/6</a:t>
             </a:fld>
             <a:endParaRPr kumimoji="1" lang="ja-JP" altLang="en-US"/>
           </a:p>
@@ -4360,16 +4302,21 @@
             </a:pPr>
             <a:r>
               <a:rPr lang="en-US" altLang="ja-JP"/>
-              <a:t>Algorand</a:t>
+              <a:t>VSCode</a:t>
             </a:r>
             <a:r>
               <a:rPr lang="ja-JP" altLang="en-US"/>
-              <a:t>教育プログラムのリポジトリを</a:t>
+              <a:t>のダウンロード</a:t>
             </a:r>
             <a:r>
               <a:rPr lang="en-US" altLang="ja-JP"/>
-              <a:t>git clone</a:t>
-            </a:r>
+              <a:t>&amp;</a:t>
+            </a:r>
+            <a:r>
+              <a:rPr lang="ja-JP" altLang="en-US"/>
+              <a:t>インストール</a:t>
+            </a:r>
+            <a:endParaRPr lang="en-US" altLang="ja-JP"/>
           </a:p>
           <a:p>
             <a:pPr marL="0" indent="0">
@@ -4377,7 +4324,7 @@
             </a:pPr>
             <a:r>
               <a:rPr lang="en-US" altLang="ja-JP" sz="2400"/>
-              <a:t>git clone https://github.com/higayasuo/algorand_education_program</a:t>
+              <a:t>https://code.visualstudio.com/</a:t>
             </a:r>
           </a:p>
           <a:p>
@@ -4391,8 +4338,30 @@
               <a:buNone/>
             </a:pPr>
             <a:r>
-              <a:rPr lang="en" altLang="ja-JP"/>
-              <a:t>cd algorand_education_program</a:t>
+              <a:rPr lang="en-US" altLang="ja-JP"/>
+              <a:t>Mac</a:t>
+            </a:r>
+            <a:r>
+              <a:rPr lang="ja-JP" altLang="en-US"/>
+              <a:t>用の</a:t>
+            </a:r>
+            <a:r>
+              <a:rPr lang="en-US" altLang="ja-JP"/>
+              <a:t>Extensions</a:t>
+            </a:r>
+            <a:r>
+              <a:rPr lang="ja-JP" altLang="en-US"/>
+              <a:t>メニューを開く</a:t>
+            </a:r>
+            <a:endParaRPr lang="en-US" altLang="ja-JP"/>
+          </a:p>
+          <a:p>
+            <a:pPr marL="0" indent="0">
+              <a:buNone/>
+            </a:pPr>
+            <a:r>
+              <a:rPr lang="en" altLang="ja-JP" sz="2400"/>
+              <a:t>Code -&gt; Preferences -&gt; Extensions</a:t>
             </a:r>
           </a:p>
           <a:p>
@@ -4406,48 +4375,32 @@
               <a:buNone/>
             </a:pPr>
             <a:r>
-              <a:rPr lang="en" altLang="ja-JP"/>
-              <a:t>Algorand Sandbox</a:t>
+              <a:rPr lang="en-US" altLang="ja-JP"/>
+              <a:t>Windows</a:t>
             </a:r>
             <a:r>
               <a:rPr lang="ja-JP" altLang="en-US"/>
-              <a:t>のリポジトリを</a:t>
+              <a:t>用の</a:t>
             </a:r>
             <a:r>
               <a:rPr lang="en-US" altLang="ja-JP"/>
-              <a:t>git clone</a:t>
-            </a:r>
+              <a:t>Extensions</a:t>
+            </a:r>
+            <a:r>
+              <a:rPr lang="ja-JP" altLang="en-US"/>
+              <a:t>メニューを開く</a:t>
+            </a:r>
+            <a:endParaRPr lang="en-US" altLang="ja-JP"/>
           </a:p>
           <a:p>
             <a:pPr marL="0" indent="0">
               <a:buNone/>
             </a:pPr>
             <a:r>
-              <a:rPr lang="en-US" altLang="ja-JP" sz="2400"/>
-              <a:t>git clone </a:t>
-            </a:r>
-            <a:r>
-              <a:rPr lang="en-US" altLang="ja-JP" sz="2400">
-                <a:hlinkClick r:id="rId3"/>
-              </a:rPr>
-              <a:t>https://github.com/algorand/sandbox</a:t>
+              <a:rPr lang="en" altLang="ja-JP" sz="2400"/>
+              <a:t>File -&gt; Preferences -&gt; Extensions</a:t>
             </a:r>
             <a:endParaRPr lang="en-US" altLang="ja-JP" sz="2400"/>
-          </a:p>
-          <a:p>
-            <a:pPr marL="0" indent="0">
-              <a:buNone/>
-            </a:pPr>
-            <a:endParaRPr lang="en-US" altLang="ja-JP" sz="2400"/>
-          </a:p>
-          <a:p>
-            <a:pPr marL="0" indent="0">
-              <a:buNone/>
-            </a:pPr>
-            <a:r>
-              <a:rPr lang="en-US" altLang="ja-JP"/>
-              <a:t>cd sandbox</a:t>
-            </a:r>
           </a:p>
           <a:p>
             <a:pPr lvl="1"/>
@@ -4519,23 +4472,27 @@
               <a:buNone/>
             </a:pPr>
             <a:r>
+              <a:rPr lang="ja-JP" altLang="en-US"/>
+              <a:t>検索窓に</a:t>
+            </a:r>
+            <a:r>
               <a:rPr lang="en-US" altLang="ja-JP"/>
-              <a:t>Sandbox</a:t>
-            </a:r>
-            <a:r>
-              <a:rPr lang="ja-JP" altLang="en-US"/>
-              <a:t>の起動</a:t>
-            </a:r>
-            <a:endParaRPr lang="en-US" altLang="ja-JP"/>
+              <a:t>remote development</a:t>
+            </a:r>
           </a:p>
           <a:p>
             <a:pPr marL="0" indent="0">
               <a:buNone/>
             </a:pPr>
             <a:r>
-              <a:rPr lang="en-US" altLang="ja-JP"/>
-              <a:t>./sandbox up dev</a:t>
-            </a:r>
+              <a:rPr lang="en-US" altLang="ja-JP" sz="2400"/>
+              <a:t>Remote Development</a:t>
+            </a:r>
+            <a:r>
+              <a:rPr lang="ja-JP" altLang="en-US" sz="2400"/>
+              <a:t>をインストール</a:t>
+            </a:r>
+            <a:endParaRPr lang="en-US" altLang="ja-JP" sz="2400"/>
           </a:p>
           <a:p>
             <a:pPr marL="0" indent="0">
@@ -4548,107 +4505,42 @@
               <a:buNone/>
             </a:pPr>
             <a:r>
-              <a:rPr lang="ja-JP" altLang="en-US"/>
-              <a:t>エラーメッセージが表示された場合は、</a:t>
-            </a:r>
-            <a:r>
               <a:rPr lang="en-US" altLang="ja-JP"/>
-              <a:t>Docker.app</a:t>
-            </a:r>
-            <a:r>
-              <a:rPr lang="ja-JP" altLang="en-US"/>
-              <a:t>が起動されているか確認する</a:t>
-            </a:r>
-            <a:endParaRPr lang="en" altLang="ja-JP"/>
+              <a:t>Remote-SSH</a:t>
+            </a:r>
           </a:p>
           <a:p>
             <a:pPr marL="0" indent="0">
               <a:buNone/>
             </a:pPr>
             <a:r>
+              <a:rPr lang="en" altLang="ja-JP" sz="2400"/>
+              <a:t>Connect to Host</a:t>
+            </a:r>
+          </a:p>
+          <a:p>
+            <a:pPr marL="0" indent="0">
+              <a:buNone/>
+            </a:pPr>
+            <a:endParaRPr lang="en" altLang="ja-JP" sz="2400"/>
+          </a:p>
+          <a:p>
+            <a:pPr marL="0" indent="0">
+              <a:buNone/>
+            </a:pPr>
+            <a:r>
               <a:rPr lang="en" altLang="ja-JP"/>
-              <a:t>One or more services failed to start.</a:t>
-            </a:r>
-            <a:br>
-              <a:rPr lang="en" altLang="ja-JP"/>
-            </a:br>
-            <a:br>
-              <a:rPr lang="en" altLang="ja-JP"/>
-            </a:br>
-            <a:r>
-              <a:rPr lang="ja-JP" altLang="en-US"/>
-              <a:t>エラーの場合、</a:t>
-            </a:r>
-            <a:r>
-              <a:rPr lang="en" altLang="ja-JP"/>
-              <a:t>Docker.app</a:t>
-            </a:r>
-            <a:r>
-              <a:rPr lang="ja-JP" altLang="en-US"/>
-              <a:t>の起動後、</a:t>
-            </a:r>
-            <a:r>
-              <a:rPr lang="en-US" altLang="ja-JP"/>
-              <a:t>Sandbox</a:t>
-            </a:r>
-            <a:r>
-              <a:rPr lang="ja-JP" altLang="en-US"/>
-              <a:t>を再起動する</a:t>
-            </a:r>
-            <a:endParaRPr lang="en-US" altLang="ja-JP"/>
+              <a:t>Terminal</a:t>
+            </a:r>
           </a:p>
           <a:p>
             <a:pPr marL="0" indent="0">
               <a:buNone/>
             </a:pPr>
             <a:r>
-              <a:rPr lang="en-US" altLang="ja-JP"/>
-              <a:t>./sandbox up dev</a:t>
-            </a:r>
-          </a:p>
-          <a:p>
-            <a:pPr marL="0" indent="0">
-              <a:buNone/>
-            </a:pPr>
-            <a:endParaRPr lang="en-US" altLang="ja-JP"/>
-          </a:p>
-          <a:p>
-            <a:pPr marL="0" indent="0">
-              <a:buNone/>
-            </a:pPr>
-            <a:r>
-              <a:rPr lang="ja-JP" altLang="en-US"/>
-              <a:t>正常に起動したら、</a:t>
-            </a:r>
-            <a:r>
-              <a:rPr lang="en-US" altLang="ja-JP"/>
-              <a:t>Sandbox</a:t>
-            </a:r>
-            <a:r>
-              <a:rPr lang="ja-JP" altLang="en-US"/>
-              <a:t>を終了させる</a:t>
-            </a:r>
-            <a:endParaRPr lang="en-US" altLang="ja-JP"/>
-          </a:p>
-          <a:p>
-            <a:pPr marL="0" indent="0">
-              <a:buNone/>
-            </a:pPr>
-            <a:r>
-              <a:rPr lang="en-US" altLang="ja-JP"/>
-              <a:t>./sandbox down</a:t>
-            </a:r>
-            <a:endParaRPr lang="en" altLang="ja-JP"/>
-          </a:p>
-          <a:p>
-            <a:pPr marL="0" indent="0">
-              <a:buNone/>
-            </a:pPr>
-            <a:endParaRPr lang="en-US" altLang="ja-JP"/>
-          </a:p>
-          <a:p>
-            <a:pPr lvl="1"/>
-            <a:endParaRPr lang="en-US" altLang="ja-JP"/>
+              <a:rPr lang="en-US" altLang="ja-JP" sz="2400"/>
+              <a:t>ubuntu@ubuntu:~$ </a:t>
+            </a:r>
           </a:p>
           <a:p>
             <a:pPr lvl="1"/>
@@ -4659,7 +4551,7 @@
     </p:spTree>
     <p:extLst>
       <p:ext uri="{BB962C8B-B14F-4D97-AF65-F5344CB8AC3E}">
-        <p14:creationId xmlns:p14="http://schemas.microsoft.com/office/powerpoint/2010/main" val="4045131297"/>
+        <p14:creationId xmlns:p14="http://schemas.microsoft.com/office/powerpoint/2010/main" val="768228091"/>
       </p:ext>
     </p:extLst>
   </p:cSld>

</xml_diff>